<commit_message>
Changes sintax di core
</commit_message>
<xml_diff>
--- a/Presentation H2.VM.pptx
+++ b/Presentation H2.VM.pptx
@@ -9259,23 +9259,7 @@
                   <a:prstClr val="white"/>
                 </a:solidFill>
               </a:rPr>
-              <a:t>vm_</a:t>
-            </a:r>
-            <a:r>
-              <a:rPr lang="en-US" err="1">
-                <a:solidFill>
-                  <a:prstClr val="white"/>
-                </a:solidFill>
-              </a:rPr>
-              <a:t>web</a:t>
-            </a:r>
-            <a:r>
-              <a:rPr lang="en-US">
-                <a:solidFill>
-                  <a:prstClr val="white"/>
-                </a:solidFill>
-              </a:rPr>
-              <a:t>.git</a:t>
+              <a:t>vm_web.git</a:t>
             </a:r>
             <a:endParaRPr kumimoji="0" lang="en-US" sz="1800" b="0" i="0" u="none" strike="noStrike" kern="1200" cap="none" spc="0" normalizeH="0" baseline="0" noProof="0" dirty="0">
               <a:ln>
@@ -10297,8 +10281,13 @@
           <a:p>
             <a:r>
               <a:rPr lang="en-ID" dirty="0"/>
-              <a:t>vagrant up</a:t>
-            </a:r>
+              <a:t>vagrant up --provider </a:t>
+            </a:r>
+            <a:r>
+              <a:rPr lang="en-ID" dirty="0" err="1"/>
+              <a:t>virtualbox</a:t>
+            </a:r>
+            <a:endParaRPr lang="en-ID" dirty="0"/>
           </a:p>
           <a:p>
             <a:r>
@@ -10906,6 +10895,38 @@
           </a:p>
         </p:txBody>
       </p:sp>
+      <p:sp>
+        <p:nvSpPr>
+          <p:cNvPr id="4" name="TextBox 3">
+            <a:extLst>
+              <a:ext uri="{FF2B5EF4-FFF2-40B4-BE49-F238E27FC236}">
+                <a16:creationId xmlns:a16="http://schemas.microsoft.com/office/drawing/2014/main" id="{8CD0A071-84C4-EE48-AEEF-EC531A523EEA}"/>
+              </a:ext>
+            </a:extLst>
+          </p:cNvPr>
+          <p:cNvSpPr txBox="1"/>
+          <p:nvPr/>
+        </p:nvSpPr>
+        <p:spPr>
+          <a:xfrm>
+            <a:off x="10820400" y="6844145"/>
+            <a:ext cx="184731" cy="369332"/>
+          </a:xfrm>
+          <a:prstGeom prst="rect">
+            <a:avLst/>
+          </a:prstGeom>
+          <a:noFill/>
+        </p:spPr>
+        <p:txBody>
+          <a:bodyPr wrap="none" rtlCol="0">
+            <a:spAutoFit/>
+          </a:bodyPr>
+          <a:lstStyle/>
+          <a:p>
+            <a:endParaRPr lang="en-US" dirty="0"/>
+          </a:p>
+        </p:txBody>
+      </p:sp>
     </p:spTree>
     <p:extLst>
       <p:ext uri="{BB962C8B-B14F-4D97-AF65-F5344CB8AC3E}">
@@ -10952,9 +10973,16 @@
             <p:ph type="title"/>
           </p:nvPr>
         </p:nvSpPr>
-        <p:spPr/>
+        <p:spPr>
+          <a:xfrm>
+            <a:off x="838200" y="365126"/>
+            <a:ext cx="10515600" cy="315912"/>
+          </a:xfrm>
+        </p:spPr>
         <p:txBody>
-          <a:bodyPr/>
+          <a:bodyPr>
+            <a:normAutofit fontScale="90000"/>
+          </a:bodyPr>
           <a:lstStyle/>
           <a:p>
             <a:r>
@@ -10980,10 +11008,15 @@
             <p:ph idx="1"/>
           </p:nvPr>
         </p:nvSpPr>
-        <p:spPr/>
+        <p:spPr>
+          <a:xfrm>
+            <a:off x="838200" y="999115"/>
+            <a:ext cx="10515600" cy="5495925"/>
+          </a:xfrm>
+        </p:spPr>
         <p:txBody>
           <a:bodyPr>
-            <a:normAutofit fontScale="55000" lnSpcReduction="20000"/>
+            <a:normAutofit fontScale="47500" lnSpcReduction="20000"/>
           </a:bodyPr>
           <a:lstStyle/>
           <a:p>
@@ -10998,10 +11031,55 @@
           </a:p>
           <a:p>
             <a:r>
-              <a:rPr lang="en-ID" dirty="0" err="1"/>
+              <a:rPr lang="en-ID" b="1" dirty="0" err="1"/>
               <a:t>sudo</a:t>
             </a:r>
             <a:r>
+              <a:rPr lang="en-ID" b="1" dirty="0"/>
+              <a:t> </a:t>
+            </a:r>
+            <a:r>
+              <a:rPr lang="en-ID" b="1" dirty="0" err="1"/>
+              <a:t>hostnamectl</a:t>
+            </a:r>
+            <a:r>
+              <a:rPr lang="en-ID" b="1" dirty="0"/>
+              <a:t> set-hostname</a:t>
+            </a:r>
+            <a:r>
+              <a:rPr lang="en-ID" dirty="0"/>
+              <a:t> </a:t>
+            </a:r>
+            <a:r>
+              <a:rPr lang="en-ID" dirty="0" err="1"/>
+              <a:t>web.local</a:t>
+            </a:r>
+            <a:endParaRPr lang="en-ID" dirty="0"/>
+          </a:p>
+          <a:p>
+            <a:r>
+              <a:rPr lang="en-ID" dirty="0" err="1"/>
+              <a:t>sudo</a:t>
+            </a:r>
+            <a:r>
+              <a:rPr lang="en-ID" dirty="0"/>
+              <a:t> </a:t>
+            </a:r>
+            <a:r>
+              <a:rPr lang="en-ID" dirty="0" err="1"/>
+              <a:t>init</a:t>
+            </a:r>
+            <a:r>
+              <a:rPr lang="en-ID" dirty="0"/>
+              <a:t> 6</a:t>
+            </a:r>
+          </a:p>
+          <a:p>
+            <a:r>
+              <a:rPr lang="en-ID" dirty="0" err="1"/>
+              <a:t>sudo</a:t>
+            </a:r>
+            <a:r>
               <a:rPr lang="en-ID" dirty="0"/>
               <a:t> apt install </a:t>
             </a:r>
@@ -11013,28 +11091,112 @@
           </a:p>
           <a:p>
             <a:r>
-              <a:rPr lang="en-ID" dirty="0" err="1"/>
+              <a:rPr lang="en-ID" dirty="0" err="1">
+                <a:solidFill>
+                  <a:srgbClr val="FF0000"/>
+                </a:solidFill>
+              </a:rPr>
               <a:t>sudo</a:t>
             </a:r>
             <a:r>
-              <a:rPr lang="en-ID" dirty="0"/>
-              <a:t> </a:t>
-            </a:r>
-            <a:r>
-              <a:rPr lang="en-ID" dirty="0" err="1"/>
+              <a:rPr lang="en-ID" dirty="0">
+                <a:solidFill>
+                  <a:srgbClr val="FF0000"/>
+                </a:solidFill>
+              </a:rPr>
+              <a:t> </a:t>
+            </a:r>
+            <a:r>
+              <a:rPr lang="en-ID" dirty="0" err="1">
+                <a:solidFill>
+                  <a:srgbClr val="FF0000"/>
+                </a:solidFill>
+              </a:rPr>
               <a:t>ufw</a:t>
             </a:r>
             <a:r>
-              <a:rPr lang="en-ID" dirty="0"/>
+              <a:rPr lang="en-ID" dirty="0">
+                <a:solidFill>
+                  <a:srgbClr val="FF0000"/>
+                </a:solidFill>
+              </a:rPr>
               <a:t> allow 'Nginx HTTP’</a:t>
             </a:r>
           </a:p>
           <a:p>
             <a:r>
-              <a:rPr lang="en-ID" dirty="0" err="1"/>
+              <a:rPr lang="en-ID" b="1" dirty="0" err="1">
+                <a:solidFill>
+                  <a:srgbClr val="FF0000"/>
+                </a:solidFill>
+              </a:rPr>
               <a:t>sudo</a:t>
             </a:r>
             <a:r>
+              <a:rPr lang="en-ID" b="1" dirty="0">
+                <a:solidFill>
+                  <a:srgbClr val="FF0000"/>
+                </a:solidFill>
+              </a:rPr>
+              <a:t> </a:t>
+            </a:r>
+            <a:r>
+              <a:rPr lang="en-ID" b="1" dirty="0" err="1">
+                <a:solidFill>
+                  <a:srgbClr val="FF0000"/>
+                </a:solidFill>
+              </a:rPr>
+              <a:t>ufw</a:t>
+            </a:r>
+            <a:r>
+              <a:rPr lang="en-ID" b="1" dirty="0">
+                <a:solidFill>
+                  <a:srgbClr val="FF0000"/>
+                </a:solidFill>
+              </a:rPr>
+              <a:t> allow 'Nginx Full'</a:t>
+            </a:r>
+          </a:p>
+          <a:p>
+            <a:r>
+              <a:rPr lang="en-ID" b="1" dirty="0" err="1">
+                <a:solidFill>
+                  <a:srgbClr val="FF0000"/>
+                </a:solidFill>
+              </a:rPr>
+              <a:t>sudo</a:t>
+            </a:r>
+            <a:r>
+              <a:rPr lang="en-ID" b="1" dirty="0">
+                <a:solidFill>
+                  <a:srgbClr val="FF0000"/>
+                </a:solidFill>
+              </a:rPr>
+              <a:t> </a:t>
+            </a:r>
+            <a:r>
+              <a:rPr lang="en-ID" b="1" dirty="0" err="1">
+                <a:solidFill>
+                  <a:srgbClr val="FF0000"/>
+                </a:solidFill>
+              </a:rPr>
+              <a:t>ufw</a:t>
+            </a:r>
+            <a:r>
+              <a:rPr lang="en-ID" b="1" dirty="0">
+                <a:solidFill>
+                  <a:srgbClr val="FF0000"/>
+                </a:solidFill>
+              </a:rPr>
+              <a:t> delete allow 'Nginx HTTP'</a:t>
+            </a:r>
+          </a:p>
+          <a:p>
+            <a:r>
+              <a:rPr lang="en-ID" dirty="0" err="1"/>
+              <a:t>sudo</a:t>
+            </a:r>
+            <a:r>
               <a:rPr lang="en-ID" dirty="0"/>
               <a:t> apt install </a:t>
             </a:r>
@@ -11310,6 +11472,62 @@
               <a:rPr lang="en-ID" dirty="0" err="1"/>
               <a:t>nginx.crt</a:t>
             </a:r>
+            <a:endParaRPr lang="en-ID" dirty="0"/>
+          </a:p>
+          <a:p>
+            <a:r>
+              <a:rPr lang="en-ID" dirty="0"/>
+              <a:t>ln -s /etc/</a:t>
+            </a:r>
+            <a:r>
+              <a:rPr lang="en-ID" dirty="0" err="1"/>
+              <a:t>nginx</a:t>
+            </a:r>
+            <a:r>
+              <a:rPr lang="en-ID" dirty="0"/>
+              <a:t>/sites-available/</a:t>
+            </a:r>
+            <a:r>
+              <a:rPr lang="en-ID" dirty="0" err="1"/>
+              <a:t>web.local</a:t>
+            </a:r>
+            <a:r>
+              <a:rPr lang="en-ID" dirty="0"/>
+              <a:t> /etc/</a:t>
+            </a:r>
+            <a:r>
+              <a:rPr lang="en-ID" dirty="0" err="1"/>
+              <a:t>nginx</a:t>
+            </a:r>
+            <a:r>
+              <a:rPr lang="en-ID" dirty="0"/>
+              <a:t>/sites-enabled/</a:t>
+            </a:r>
+          </a:p>
+          <a:p>
+            <a:r>
+              <a:rPr lang="en-ID" dirty="0" err="1"/>
+              <a:t>sudo</a:t>
+            </a:r>
+            <a:r>
+              <a:rPr lang="en-ID" dirty="0"/>
+              <a:t> </a:t>
+            </a:r>
+            <a:r>
+              <a:rPr lang="en-ID" dirty="0" err="1"/>
+              <a:t>systemctl</a:t>
+            </a:r>
+            <a:r>
+              <a:rPr lang="en-ID" dirty="0"/>
+              <a:t> restart </a:t>
+            </a:r>
+            <a:r>
+              <a:rPr lang="en-ID" dirty="0" err="1"/>
+              <a:t>nginx.service</a:t>
+            </a:r>
+            <a:endParaRPr lang="en-US" dirty="0"/>
+          </a:p>
+          <a:p>
             <a:endParaRPr lang="en-ID" dirty="0"/>
           </a:p>
           <a:p>
@@ -12891,22 +13109,6 @@
             <a:br>
               <a:rPr lang="en-ID" dirty="0"/>
             </a:br>
-            <a:r>
-              <a:rPr lang="en-ID" dirty="0" err="1"/>
-              <a:t>sudo</a:t>
-            </a:r>
-            <a:r>
-              <a:rPr lang="en-ID" dirty="0"/>
-              <a:t> </a:t>
-            </a:r>
-            <a:r>
-              <a:rPr lang="en-ID" dirty="0" err="1"/>
-              <a:t>wget</a:t>
-            </a:r>
-            <a:r>
-              <a:rPr lang="en-ID" dirty="0"/>
-              <a:t> curl bash-completion</a:t>
-            </a:r>
             <a:endParaRPr lang="en-US" dirty="0"/>
           </a:p>
         </p:txBody>

</xml_diff>